<commit_message>
Update the scss file to change the font size of the title.
</commit_message>
<xml_diff>
--- a/images/Image_In_ppt.pptx
+++ b/images/Image_In_ppt.pptx
@@ -23,7 +23,8 @@
     <p:sldId id="271" r:id="rId17"/>
     <p:sldId id="272" r:id="rId18"/>
     <p:sldId id="276" r:id="rId19"/>
-    <p:sldId id="259" r:id="rId20"/>
+    <p:sldId id="256" r:id="rId20"/>
+    <p:sldId id="259" r:id="rId21"/>
   </p:sldIdLst>
   <p:sldSz cx="12192000" cy="6858000"/>
   <p:notesSz cx="6858000" cy="9144000"/>
@@ -5398,10 +5399,10 @@
       </p:grpSpPr>
       <p:grpSp>
         <p:nvGrpSpPr>
-          <p:cNvPr id="60" name="Group 59">
-            <a:extLst>
-              <a:ext uri="{FF2B5EF4-FFF2-40B4-BE49-F238E27FC236}">
-                <a16:creationId xmlns:a16="http://schemas.microsoft.com/office/drawing/2014/main" id="{93408590-3326-44BD-8A28-617570F407AD}"/>
+          <p:cNvPr id="57" name="Group 56">
+            <a:extLst>
+              <a:ext uri="{FF2B5EF4-FFF2-40B4-BE49-F238E27FC236}">
+                <a16:creationId xmlns:a16="http://schemas.microsoft.com/office/drawing/2014/main" id="{CBB4894E-14D5-4F52-883C-3FB5AD497EC9}"/>
               </a:ext>
             </a:extLst>
           </p:cNvPr>
@@ -5410,18 +5411,274 @@
         </p:nvGrpSpPr>
         <p:grpSpPr>
           <a:xfrm>
-            <a:off x="895201" y="531975"/>
-            <a:ext cx="9908288" cy="5761545"/>
-            <a:chOff x="895201" y="531975"/>
-            <a:chExt cx="9908288" cy="5761545"/>
+            <a:off x="895201" y="2334879"/>
+            <a:ext cx="5810250" cy="1304925"/>
+            <a:chOff x="895201" y="2334879"/>
+            <a:chExt cx="5810250" cy="1304925"/>
+          </a:xfrm>
+        </p:grpSpPr>
+        <p:pic>
+          <p:nvPicPr>
+            <p:cNvPr id="5" name="Picture 4">
+              <a:extLst>
+                <a:ext uri="{FF2B5EF4-FFF2-40B4-BE49-F238E27FC236}">
+                  <a16:creationId xmlns:a16="http://schemas.microsoft.com/office/drawing/2014/main" id="{AEE233D7-2A5B-4820-B278-65CF1F4E110A}"/>
+                </a:ext>
+              </a:extLst>
+            </p:cNvPr>
+            <p:cNvPicPr>
+              <a:picLocks noChangeAspect="1"/>
+            </p:cNvPicPr>
+            <p:nvPr/>
+          </p:nvPicPr>
+          <p:blipFill>
+            <a:blip r:embed="rId2"/>
+            <a:stretch>
+              <a:fillRect/>
+            </a:stretch>
+          </p:blipFill>
+          <p:spPr>
+            <a:xfrm>
+              <a:off x="895201" y="2334879"/>
+              <a:ext cx="5810250" cy="1304925"/>
+            </a:xfrm>
+            <a:prstGeom prst="rect">
+              <a:avLst/>
+            </a:prstGeom>
+          </p:spPr>
+        </p:pic>
+        <p:sp>
+          <p:nvSpPr>
+            <p:cNvPr id="13" name="Rectangle 12">
+              <a:extLst>
+                <a:ext uri="{FF2B5EF4-FFF2-40B4-BE49-F238E27FC236}">
+                  <a16:creationId xmlns:a16="http://schemas.microsoft.com/office/drawing/2014/main" id="{1CD16C63-D104-4C90-9683-E7E4657029C4}"/>
+                </a:ext>
+              </a:extLst>
+            </p:cNvPr>
+            <p:cNvSpPr/>
+            <p:nvPr/>
+          </p:nvSpPr>
+          <p:spPr>
+            <a:xfrm>
+              <a:off x="3416712" y="2393581"/>
+              <a:ext cx="1219200" cy="190543"/>
+            </a:xfrm>
+            <a:prstGeom prst="rect">
+              <a:avLst/>
+            </a:prstGeom>
+            <a:noFill/>
+            <a:ln w="19050">
+              <a:solidFill>
+                <a:schemeClr val="accent1"/>
+              </a:solidFill>
+            </a:ln>
+          </p:spPr>
+          <p:style>
+            <a:lnRef idx="2">
+              <a:schemeClr val="accent1">
+                <a:shade val="50000"/>
+              </a:schemeClr>
+            </a:lnRef>
+            <a:fillRef idx="1">
+              <a:schemeClr val="accent1"/>
+            </a:fillRef>
+            <a:effectRef idx="0">
+              <a:schemeClr val="accent1"/>
+            </a:effectRef>
+            <a:fontRef idx="minor">
+              <a:schemeClr val="lt1"/>
+            </a:fontRef>
+          </p:style>
+          <p:txBody>
+            <a:bodyPr rtlCol="0" anchor="ctr"/>
+            <a:lstStyle/>
+            <a:p>
+              <a:pPr algn="ctr"/>
+              <a:endParaRPr lang="en-SG"/>
+            </a:p>
+          </p:txBody>
+        </p:sp>
+        <p:sp>
+          <p:nvSpPr>
+            <p:cNvPr id="16" name="Rectangle 15">
+              <a:extLst>
+                <a:ext uri="{FF2B5EF4-FFF2-40B4-BE49-F238E27FC236}">
+                  <a16:creationId xmlns:a16="http://schemas.microsoft.com/office/drawing/2014/main" id="{918862A3-7BE1-4679-9714-EE259F78089F}"/>
+                </a:ext>
+              </a:extLst>
+            </p:cNvPr>
+            <p:cNvSpPr/>
+            <p:nvPr/>
+          </p:nvSpPr>
+          <p:spPr>
+            <a:xfrm>
+              <a:off x="942826" y="2387346"/>
+              <a:ext cx="2376990" cy="190543"/>
+            </a:xfrm>
+            <a:prstGeom prst="rect">
+              <a:avLst/>
+            </a:prstGeom>
+            <a:noFill/>
+            <a:ln w="19050">
+              <a:solidFill>
+                <a:schemeClr val="accent1"/>
+              </a:solidFill>
+            </a:ln>
+          </p:spPr>
+          <p:style>
+            <a:lnRef idx="2">
+              <a:schemeClr val="accent1">
+                <a:shade val="50000"/>
+              </a:schemeClr>
+            </a:lnRef>
+            <a:fillRef idx="1">
+              <a:schemeClr val="accent1"/>
+            </a:fillRef>
+            <a:effectRef idx="0">
+              <a:schemeClr val="accent1"/>
+            </a:effectRef>
+            <a:fontRef idx="minor">
+              <a:schemeClr val="lt1"/>
+            </a:fontRef>
+          </p:style>
+          <p:txBody>
+            <a:bodyPr rtlCol="0" anchor="ctr"/>
+            <a:lstStyle/>
+            <a:p>
+              <a:pPr algn="ctr"/>
+              <a:endParaRPr lang="en-SG"/>
+            </a:p>
+          </p:txBody>
+        </p:sp>
+        <p:sp>
+          <p:nvSpPr>
+            <p:cNvPr id="40" name="Right Brace 39">
+              <a:extLst>
+                <a:ext uri="{FF2B5EF4-FFF2-40B4-BE49-F238E27FC236}">
+                  <a16:creationId xmlns:a16="http://schemas.microsoft.com/office/drawing/2014/main" id="{16C66EB9-AE45-48F2-8912-1F929635A613}"/>
+                </a:ext>
+              </a:extLst>
+            </p:cNvPr>
+            <p:cNvSpPr/>
+            <p:nvPr/>
+          </p:nvSpPr>
+          <p:spPr>
+            <a:xfrm>
+              <a:off x="1814995" y="2968291"/>
+              <a:ext cx="185255" cy="652463"/>
+            </a:xfrm>
+            <a:prstGeom prst="rightBrace">
+              <a:avLst/>
+            </a:prstGeom>
+            <a:ln w="19050">
+              <a:solidFill>
+                <a:schemeClr val="tx1"/>
+              </a:solidFill>
+            </a:ln>
+          </p:spPr>
+          <p:style>
+            <a:lnRef idx="1">
+              <a:schemeClr val="accent1"/>
+            </a:lnRef>
+            <a:fillRef idx="0">
+              <a:schemeClr val="accent1"/>
+            </a:fillRef>
+            <a:effectRef idx="0">
+              <a:schemeClr val="accent1"/>
+            </a:effectRef>
+            <a:fontRef idx="minor">
+              <a:schemeClr val="tx1"/>
+            </a:fontRef>
+          </p:style>
+          <p:txBody>
+            <a:bodyPr rtlCol="0" anchor="ctr"/>
+            <a:lstStyle/>
+            <a:p>
+              <a:pPr algn="ctr"/>
+              <a:endParaRPr lang="en-SG"/>
+            </a:p>
+          </p:txBody>
+        </p:sp>
+        <p:sp>
+          <p:nvSpPr>
+            <p:cNvPr id="55" name="Rectangle 54">
+              <a:extLst>
+                <a:ext uri="{FF2B5EF4-FFF2-40B4-BE49-F238E27FC236}">
+                  <a16:creationId xmlns:a16="http://schemas.microsoft.com/office/drawing/2014/main" id="{5F897656-D9A6-4386-A7C8-43EB8739D17F}"/>
+                </a:ext>
+              </a:extLst>
+            </p:cNvPr>
+            <p:cNvSpPr/>
+            <p:nvPr/>
+          </p:nvSpPr>
+          <p:spPr>
+            <a:xfrm>
+              <a:off x="985106" y="3388541"/>
+              <a:ext cx="848939" cy="190543"/>
+            </a:xfrm>
+            <a:prstGeom prst="rect">
+              <a:avLst/>
+            </a:prstGeom>
+            <a:noFill/>
+            <a:ln w="19050">
+              <a:solidFill>
+                <a:schemeClr val="accent1"/>
+              </a:solidFill>
+            </a:ln>
+          </p:spPr>
+          <p:style>
+            <a:lnRef idx="2">
+              <a:schemeClr val="accent1">
+                <a:shade val="50000"/>
+              </a:schemeClr>
+            </a:lnRef>
+            <a:fillRef idx="1">
+              <a:schemeClr val="accent1"/>
+            </a:fillRef>
+            <a:effectRef idx="0">
+              <a:schemeClr val="accent1"/>
+            </a:effectRef>
+            <a:fontRef idx="minor">
+              <a:schemeClr val="lt1"/>
+            </a:fontRef>
+          </p:style>
+          <p:txBody>
+            <a:bodyPr rtlCol="0" anchor="ctr"/>
+            <a:lstStyle/>
+            <a:p>
+              <a:pPr algn="ctr"/>
+              <a:endParaRPr lang="en-SG"/>
+            </a:p>
+          </p:txBody>
+        </p:sp>
+      </p:grpSp>
+      <p:grpSp>
+        <p:nvGrpSpPr>
+          <p:cNvPr id="52" name="Group 51">
+            <a:extLst>
+              <a:ext uri="{FF2B5EF4-FFF2-40B4-BE49-F238E27FC236}">
+                <a16:creationId xmlns:a16="http://schemas.microsoft.com/office/drawing/2014/main" id="{9105D429-153F-48F1-A8CA-FEEF23922C4B}"/>
+              </a:ext>
+            </a:extLst>
+          </p:cNvPr>
+          <p:cNvGrpSpPr/>
+          <p:nvPr/>
+        </p:nvGrpSpPr>
+        <p:grpSpPr>
+          <a:xfrm>
+            <a:off x="7256257" y="563897"/>
+            <a:ext cx="3511273" cy="4129991"/>
+            <a:chOff x="7056232" y="1297322"/>
+            <a:chExt cx="3511273" cy="4129991"/>
           </a:xfrm>
         </p:grpSpPr>
         <p:grpSp>
           <p:nvGrpSpPr>
-            <p:cNvPr id="57" name="Group 56">
+            <p:cNvPr id="45" name="Group 44">
               <a:extLst>
                 <a:ext uri="{FF2B5EF4-FFF2-40B4-BE49-F238E27FC236}">
-                  <a16:creationId xmlns:a16="http://schemas.microsoft.com/office/drawing/2014/main" id="{CBB4894E-14D5-4F52-883C-3FB5AD497EC9}"/>
+                  <a16:creationId xmlns:a16="http://schemas.microsoft.com/office/drawing/2014/main" id="{4A96A121-3555-41B1-B2FE-FF0DB0C7B8DF}"/>
                 </a:ext>
               </a:extLst>
             </p:cNvPr>
@@ -5430,18 +5687,18 @@
           </p:nvGrpSpPr>
           <p:grpSpPr>
             <a:xfrm>
-              <a:off x="895201" y="2334879"/>
-              <a:ext cx="5810250" cy="1304925"/>
-              <a:chOff x="895201" y="2334879"/>
-              <a:chExt cx="5810250" cy="1304925"/>
+              <a:off x="7186130" y="1722088"/>
+              <a:ext cx="3381375" cy="3705225"/>
+              <a:chOff x="7186130" y="1722088"/>
+              <a:chExt cx="3381375" cy="3705225"/>
             </a:xfrm>
           </p:grpSpPr>
           <p:pic>
             <p:nvPicPr>
-              <p:cNvPr id="5" name="Picture 4">
+              <p:cNvPr id="10" name="Picture 9">
                 <a:extLst>
                   <a:ext uri="{FF2B5EF4-FFF2-40B4-BE49-F238E27FC236}">
-                    <a16:creationId xmlns:a16="http://schemas.microsoft.com/office/drawing/2014/main" id="{AEE233D7-2A5B-4820-B278-65CF1F4E110A}"/>
+                    <a16:creationId xmlns:a16="http://schemas.microsoft.com/office/drawing/2014/main" id="{C43BF051-CEE0-40E2-BACB-853404B5EF4A}"/>
                   </a:ext>
                 </a:extLst>
               </p:cNvPr>
@@ -5451,15 +5708,15 @@
               <p:nvPr/>
             </p:nvPicPr>
             <p:blipFill>
-              <a:blip r:embed="rId2"/>
+              <a:blip r:embed="rId3"/>
               <a:stretch>
                 <a:fillRect/>
               </a:stretch>
             </p:blipFill>
             <p:spPr>
               <a:xfrm>
-                <a:off x="895201" y="2334879"/>
-                <a:ext cx="5810250" cy="1304925"/>
+                <a:off x="7186130" y="1722088"/>
+                <a:ext cx="3381375" cy="3705225"/>
               </a:xfrm>
               <a:prstGeom prst="rect">
                 <a:avLst/>
@@ -5468,10 +5725,10 @@
           </p:pic>
           <p:sp>
             <p:nvSpPr>
-              <p:cNvPr id="13" name="Rectangle 12">
+              <p:cNvPr id="19" name="Rectangle 18">
                 <a:extLst>
                   <a:ext uri="{FF2B5EF4-FFF2-40B4-BE49-F238E27FC236}">
-                    <a16:creationId xmlns:a16="http://schemas.microsoft.com/office/drawing/2014/main" id="{1CD16C63-D104-4C90-9683-E7E4657029C4}"/>
+                    <a16:creationId xmlns:a16="http://schemas.microsoft.com/office/drawing/2014/main" id="{ABCFC8D8-082B-4D1A-8DE0-67B61CA7D409}"/>
                   </a:ext>
                 </a:extLst>
               </p:cNvPr>
@@ -5480,8 +5737,8 @@
             </p:nvSpPr>
             <p:spPr>
               <a:xfrm>
-                <a:off x="3416712" y="2393581"/>
-                <a:ext cx="1219200" cy="190543"/>
+                <a:off x="7535938" y="3077829"/>
+                <a:ext cx="2514600" cy="292085"/>
               </a:xfrm>
               <a:prstGeom prst="rect">
                 <a:avLst/>
@@ -5520,10 +5777,10 @@
           </p:sp>
           <p:sp>
             <p:nvSpPr>
-              <p:cNvPr id="16" name="Rectangle 15">
+              <p:cNvPr id="43" name="Rectangle 42">
                 <a:extLst>
                   <a:ext uri="{FF2B5EF4-FFF2-40B4-BE49-F238E27FC236}">
-                    <a16:creationId xmlns:a16="http://schemas.microsoft.com/office/drawing/2014/main" id="{918862A3-7BE1-4679-9714-EE259F78089F}"/>
+                    <a16:creationId xmlns:a16="http://schemas.microsoft.com/office/drawing/2014/main" id="{41BEA0A1-BC12-44CF-B214-2A669FA93629}"/>
                   </a:ext>
                 </a:extLst>
               </p:cNvPr>
@@ -5532,109 +5789,8 @@
             </p:nvSpPr>
             <p:spPr>
               <a:xfrm>
-                <a:off x="942826" y="2387346"/>
-                <a:ext cx="2376990" cy="190543"/>
-              </a:xfrm>
-              <a:prstGeom prst="rect">
-                <a:avLst/>
-              </a:prstGeom>
-              <a:noFill/>
-              <a:ln w="19050">
-                <a:solidFill>
-                  <a:schemeClr val="accent1"/>
-                </a:solidFill>
-              </a:ln>
-            </p:spPr>
-            <p:style>
-              <a:lnRef idx="2">
-                <a:schemeClr val="accent1">
-                  <a:shade val="50000"/>
-                </a:schemeClr>
-              </a:lnRef>
-              <a:fillRef idx="1">
-                <a:schemeClr val="accent1"/>
-              </a:fillRef>
-              <a:effectRef idx="0">
-                <a:schemeClr val="accent1"/>
-              </a:effectRef>
-              <a:fontRef idx="minor">
-                <a:schemeClr val="lt1"/>
-              </a:fontRef>
-            </p:style>
-            <p:txBody>
-              <a:bodyPr rtlCol="0" anchor="ctr"/>
-              <a:lstStyle/>
-              <a:p>
-                <a:pPr algn="ctr"/>
-                <a:endParaRPr lang="en-SG"/>
-              </a:p>
-            </p:txBody>
-          </p:sp>
-          <p:sp>
-            <p:nvSpPr>
-              <p:cNvPr id="40" name="Right Brace 39">
-                <a:extLst>
-                  <a:ext uri="{FF2B5EF4-FFF2-40B4-BE49-F238E27FC236}">
-                    <a16:creationId xmlns:a16="http://schemas.microsoft.com/office/drawing/2014/main" id="{16C66EB9-AE45-48F2-8912-1F929635A613}"/>
-                  </a:ext>
-                </a:extLst>
-              </p:cNvPr>
-              <p:cNvSpPr/>
-              <p:nvPr/>
-            </p:nvSpPr>
-            <p:spPr>
-              <a:xfrm>
-                <a:off x="1814995" y="2968291"/>
-                <a:ext cx="185255" cy="652463"/>
-              </a:xfrm>
-              <a:prstGeom prst="rightBrace">
-                <a:avLst/>
-              </a:prstGeom>
-              <a:ln w="19050">
-                <a:solidFill>
-                  <a:schemeClr val="tx1"/>
-                </a:solidFill>
-              </a:ln>
-            </p:spPr>
-            <p:style>
-              <a:lnRef idx="1">
-                <a:schemeClr val="accent1"/>
-              </a:lnRef>
-              <a:fillRef idx="0">
-                <a:schemeClr val="accent1"/>
-              </a:fillRef>
-              <a:effectRef idx="0">
-                <a:schemeClr val="accent1"/>
-              </a:effectRef>
-              <a:fontRef idx="minor">
-                <a:schemeClr val="tx1"/>
-              </a:fontRef>
-            </p:style>
-            <p:txBody>
-              <a:bodyPr rtlCol="0" anchor="ctr"/>
-              <a:lstStyle/>
-              <a:p>
-                <a:pPr algn="ctr"/>
-                <a:endParaRPr lang="en-SG"/>
-              </a:p>
-            </p:txBody>
-          </p:sp>
-          <p:sp>
-            <p:nvSpPr>
-              <p:cNvPr id="55" name="Rectangle 54">
-                <a:extLst>
-                  <a:ext uri="{FF2B5EF4-FFF2-40B4-BE49-F238E27FC236}">
-                    <a16:creationId xmlns:a16="http://schemas.microsoft.com/office/drawing/2014/main" id="{5F897656-D9A6-4386-A7C8-43EB8739D17F}"/>
-                  </a:ext>
-                </a:extLst>
-              </p:cNvPr>
-              <p:cNvSpPr/>
-              <p:nvPr/>
-            </p:nvSpPr>
-            <p:spPr>
-              <a:xfrm>
-                <a:off x="985106" y="3388541"/>
-                <a:ext cx="848939" cy="190543"/>
+                <a:off x="7533792" y="4431977"/>
+                <a:ext cx="1981683" cy="292085"/>
               </a:xfrm>
               <a:prstGeom prst="rect">
                 <a:avLst/>
@@ -5672,478 +5828,12 @@
             </p:txBody>
           </p:sp>
         </p:grpSp>
-        <p:grpSp>
-          <p:nvGrpSpPr>
-            <p:cNvPr id="52" name="Group 51">
+        <p:sp>
+          <p:nvSpPr>
+            <p:cNvPr id="51" name="TextBox 50">
               <a:extLst>
                 <a:ext uri="{FF2B5EF4-FFF2-40B4-BE49-F238E27FC236}">
-                  <a16:creationId xmlns:a16="http://schemas.microsoft.com/office/drawing/2014/main" id="{9105D429-153F-48F1-A8CA-FEEF23922C4B}"/>
-                </a:ext>
-              </a:extLst>
-            </p:cNvPr>
-            <p:cNvGrpSpPr/>
-            <p:nvPr/>
-          </p:nvGrpSpPr>
-          <p:grpSpPr>
-            <a:xfrm>
-              <a:off x="7256257" y="563897"/>
-              <a:ext cx="3511273" cy="4129991"/>
-              <a:chOff x="7056232" y="1297322"/>
-              <a:chExt cx="3511273" cy="4129991"/>
-            </a:xfrm>
-          </p:grpSpPr>
-          <p:grpSp>
-            <p:nvGrpSpPr>
-              <p:cNvPr id="45" name="Group 44">
-                <a:extLst>
-                  <a:ext uri="{FF2B5EF4-FFF2-40B4-BE49-F238E27FC236}">
-                    <a16:creationId xmlns:a16="http://schemas.microsoft.com/office/drawing/2014/main" id="{4A96A121-3555-41B1-B2FE-FF0DB0C7B8DF}"/>
-                  </a:ext>
-                </a:extLst>
-              </p:cNvPr>
-              <p:cNvGrpSpPr/>
-              <p:nvPr/>
-            </p:nvGrpSpPr>
-            <p:grpSpPr>
-              <a:xfrm>
-                <a:off x="7186130" y="1722088"/>
-                <a:ext cx="3381375" cy="3705225"/>
-                <a:chOff x="7186130" y="1722088"/>
-                <a:chExt cx="3381375" cy="3705225"/>
-              </a:xfrm>
-            </p:grpSpPr>
-            <p:pic>
-              <p:nvPicPr>
-                <p:cNvPr id="10" name="Picture 9">
-                  <a:extLst>
-                    <a:ext uri="{FF2B5EF4-FFF2-40B4-BE49-F238E27FC236}">
-                      <a16:creationId xmlns:a16="http://schemas.microsoft.com/office/drawing/2014/main" id="{C43BF051-CEE0-40E2-BACB-853404B5EF4A}"/>
-                    </a:ext>
-                  </a:extLst>
-                </p:cNvPr>
-                <p:cNvPicPr>
-                  <a:picLocks noChangeAspect="1"/>
-                </p:cNvPicPr>
-                <p:nvPr/>
-              </p:nvPicPr>
-              <p:blipFill>
-                <a:blip r:embed="rId3"/>
-                <a:stretch>
-                  <a:fillRect/>
-                </a:stretch>
-              </p:blipFill>
-              <p:spPr>
-                <a:xfrm>
-                  <a:off x="7186130" y="1722088"/>
-                  <a:ext cx="3381375" cy="3705225"/>
-                </a:xfrm>
-                <a:prstGeom prst="rect">
-                  <a:avLst/>
-                </a:prstGeom>
-              </p:spPr>
-            </p:pic>
-            <p:sp>
-              <p:nvSpPr>
-                <p:cNvPr id="19" name="Rectangle 18">
-                  <a:extLst>
-                    <a:ext uri="{FF2B5EF4-FFF2-40B4-BE49-F238E27FC236}">
-                      <a16:creationId xmlns:a16="http://schemas.microsoft.com/office/drawing/2014/main" id="{ABCFC8D8-082B-4D1A-8DE0-67B61CA7D409}"/>
-                    </a:ext>
-                  </a:extLst>
-                </p:cNvPr>
-                <p:cNvSpPr/>
-                <p:nvPr/>
-              </p:nvSpPr>
-              <p:spPr>
-                <a:xfrm>
-                  <a:off x="7535938" y="3077829"/>
-                  <a:ext cx="2514600" cy="292085"/>
-                </a:xfrm>
-                <a:prstGeom prst="rect">
-                  <a:avLst/>
-                </a:prstGeom>
-                <a:noFill/>
-                <a:ln w="19050">
-                  <a:solidFill>
-                    <a:schemeClr val="accent1"/>
-                  </a:solidFill>
-                </a:ln>
-              </p:spPr>
-              <p:style>
-                <a:lnRef idx="2">
-                  <a:schemeClr val="accent1">
-                    <a:shade val="50000"/>
-                  </a:schemeClr>
-                </a:lnRef>
-                <a:fillRef idx="1">
-                  <a:schemeClr val="accent1"/>
-                </a:fillRef>
-                <a:effectRef idx="0">
-                  <a:schemeClr val="accent1"/>
-                </a:effectRef>
-                <a:fontRef idx="minor">
-                  <a:schemeClr val="lt1"/>
-                </a:fontRef>
-              </p:style>
-              <p:txBody>
-                <a:bodyPr rtlCol="0" anchor="ctr"/>
-                <a:lstStyle/>
-                <a:p>
-                  <a:pPr algn="ctr"/>
-                  <a:endParaRPr lang="en-SG"/>
-                </a:p>
-              </p:txBody>
-            </p:sp>
-            <p:sp>
-              <p:nvSpPr>
-                <p:cNvPr id="43" name="Rectangle 42">
-                  <a:extLst>
-                    <a:ext uri="{FF2B5EF4-FFF2-40B4-BE49-F238E27FC236}">
-                      <a16:creationId xmlns:a16="http://schemas.microsoft.com/office/drawing/2014/main" id="{41BEA0A1-BC12-44CF-B214-2A669FA93629}"/>
-                    </a:ext>
-                  </a:extLst>
-                </p:cNvPr>
-                <p:cNvSpPr/>
-                <p:nvPr/>
-              </p:nvSpPr>
-              <p:spPr>
-                <a:xfrm>
-                  <a:off x="7533792" y="4431977"/>
-                  <a:ext cx="1981683" cy="292085"/>
-                </a:xfrm>
-                <a:prstGeom prst="rect">
-                  <a:avLst/>
-                </a:prstGeom>
-                <a:noFill/>
-                <a:ln w="19050">
-                  <a:solidFill>
-                    <a:schemeClr val="accent1"/>
-                  </a:solidFill>
-                </a:ln>
-              </p:spPr>
-              <p:style>
-                <a:lnRef idx="2">
-                  <a:schemeClr val="accent1">
-                    <a:shade val="50000"/>
-                  </a:schemeClr>
-                </a:lnRef>
-                <a:fillRef idx="1">
-                  <a:schemeClr val="accent1"/>
-                </a:fillRef>
-                <a:effectRef idx="0">
-                  <a:schemeClr val="accent1"/>
-                </a:effectRef>
-                <a:fontRef idx="minor">
-                  <a:schemeClr val="lt1"/>
-                </a:fontRef>
-              </p:style>
-              <p:txBody>
-                <a:bodyPr rtlCol="0" anchor="ctr"/>
-                <a:lstStyle/>
-                <a:p>
-                  <a:pPr algn="ctr"/>
-                  <a:endParaRPr lang="en-SG"/>
-                </a:p>
-              </p:txBody>
-            </p:sp>
-          </p:grpSp>
-          <p:sp>
-            <p:nvSpPr>
-              <p:cNvPr id="51" name="TextBox 50">
-                <a:extLst>
-                  <a:ext uri="{FF2B5EF4-FFF2-40B4-BE49-F238E27FC236}">
-                    <a16:creationId xmlns:a16="http://schemas.microsoft.com/office/drawing/2014/main" id="{64F614D8-7F05-443E-B96A-89E2735D52A5}"/>
-                  </a:ext>
-                </a:extLst>
-              </p:cNvPr>
-              <p:cNvSpPr txBox="1"/>
-              <p:nvPr/>
-            </p:nvSpPr>
-            <p:spPr>
-              <a:xfrm>
-                <a:off x="7056232" y="1297322"/>
-                <a:ext cx="3501748" cy="369332"/>
-              </a:xfrm>
-              <a:prstGeom prst="rect">
-                <a:avLst/>
-              </a:prstGeom>
-              <a:noFill/>
-            </p:spPr>
-            <p:txBody>
-              <a:bodyPr wrap="square" rtlCol="0">
-                <a:spAutoFit/>
-              </a:bodyPr>
-              <a:lstStyle/>
-              <a:p>
-                <a:pPr algn="ctr"/>
-                <a:r>
-                  <a:rPr lang="en-SG" dirty="0"/>
-                  <a:t>Step 2. Call script in console</a:t>
-                </a:r>
-              </a:p>
-            </p:txBody>
-          </p:sp>
-        </p:grpSp>
-        <p:pic>
-          <p:nvPicPr>
-            <p:cNvPr id="11" name="Picture 10">
-              <a:extLst>
-                <a:ext uri="{FF2B5EF4-FFF2-40B4-BE49-F238E27FC236}">
-                  <a16:creationId xmlns:a16="http://schemas.microsoft.com/office/drawing/2014/main" id="{DAB1396F-0F10-41E8-9126-6C01B42B164A}"/>
-                </a:ext>
-              </a:extLst>
-            </p:cNvPr>
-            <p:cNvPicPr>
-              <a:picLocks noChangeAspect="1"/>
-            </p:cNvPicPr>
-            <p:nvPr/>
-          </p:nvPicPr>
-          <p:blipFill rotWithShape="1">
-            <a:blip r:embed="rId4"/>
-            <a:srcRect t="13773" r="39575" b="-18087"/>
-            <a:stretch/>
-          </p:blipFill>
-          <p:spPr>
-            <a:xfrm>
-              <a:off x="7350194" y="5453529"/>
-              <a:ext cx="3453295" cy="268272"/>
-            </a:xfrm>
-            <a:prstGeom prst="rect">
-              <a:avLst/>
-            </a:prstGeom>
-          </p:spPr>
-        </p:pic>
-        <p:cxnSp>
-          <p:nvCxnSpPr>
-            <p:cNvPr id="9" name="Straight Arrow Connector 8">
-              <a:extLst>
-                <a:ext uri="{FF2B5EF4-FFF2-40B4-BE49-F238E27FC236}">
-                  <a16:creationId xmlns:a16="http://schemas.microsoft.com/office/drawing/2014/main" id="{DACEDD70-68D5-4297-AB00-17CF5551C93B}"/>
-                </a:ext>
-              </a:extLst>
-            </p:cNvPr>
-            <p:cNvCxnSpPr>
-              <a:cxnSpLocks/>
-              <a:stCxn id="6" idx="2"/>
-              <a:endCxn id="16" idx="0"/>
-            </p:cNvCxnSpPr>
-            <p:nvPr/>
-          </p:nvCxnSpPr>
-          <p:spPr>
-            <a:xfrm flipH="1">
-              <a:off x="2131321" y="1657129"/>
-              <a:ext cx="1703321" cy="730217"/>
-            </a:xfrm>
-            <a:prstGeom prst="straightConnector1">
-              <a:avLst/>
-            </a:prstGeom>
-            <a:ln w="19050">
-              <a:solidFill>
-                <a:schemeClr val="accent1"/>
-              </a:solidFill>
-              <a:tailEnd type="triangle"/>
-            </a:ln>
-          </p:spPr>
-          <p:style>
-            <a:lnRef idx="1">
-              <a:schemeClr val="accent1"/>
-            </a:lnRef>
-            <a:fillRef idx="0">
-              <a:schemeClr val="accent1"/>
-            </a:fillRef>
-            <a:effectRef idx="0">
-              <a:schemeClr val="accent1"/>
-            </a:effectRef>
-            <a:fontRef idx="minor">
-              <a:schemeClr val="tx1"/>
-            </a:fontRef>
-          </p:style>
-        </p:cxnSp>
-        <p:cxnSp>
-          <p:nvCxnSpPr>
-            <p:cNvPr id="34" name="Straight Arrow Connector 33">
-              <a:extLst>
-                <a:ext uri="{FF2B5EF4-FFF2-40B4-BE49-F238E27FC236}">
-                  <a16:creationId xmlns:a16="http://schemas.microsoft.com/office/drawing/2014/main" id="{822BAE6C-4154-472B-B1CD-C4E87C228F5C}"/>
-                </a:ext>
-              </a:extLst>
-            </p:cNvPr>
-            <p:cNvCxnSpPr>
-              <a:cxnSpLocks/>
-              <a:stCxn id="19" idx="1"/>
-              <a:endCxn id="13" idx="3"/>
-            </p:cNvCxnSpPr>
-            <p:nvPr/>
-          </p:nvCxnSpPr>
-          <p:spPr>
-            <a:xfrm flipH="1" flipV="1">
-              <a:off x="4635912" y="2488853"/>
-              <a:ext cx="3100051" cy="1594"/>
-            </a:xfrm>
-            <a:prstGeom prst="straightConnector1">
-              <a:avLst/>
-            </a:prstGeom>
-            <a:ln w="19050">
-              <a:solidFill>
-                <a:schemeClr val="accent1"/>
-              </a:solidFill>
-              <a:tailEnd type="triangle"/>
-            </a:ln>
-          </p:spPr>
-          <p:style>
-            <a:lnRef idx="1">
-              <a:schemeClr val="accent1"/>
-            </a:lnRef>
-            <a:fillRef idx="0">
-              <a:schemeClr val="accent1"/>
-            </a:fillRef>
-            <a:effectRef idx="0">
-              <a:schemeClr val="accent1"/>
-            </a:effectRef>
-            <a:fontRef idx="minor">
-              <a:schemeClr val="tx1"/>
-            </a:fontRef>
-          </p:style>
-        </p:cxnSp>
-        <p:cxnSp>
-          <p:nvCxnSpPr>
-            <p:cNvPr id="41" name="Straight Arrow Connector 40">
-              <a:extLst>
-                <a:ext uri="{FF2B5EF4-FFF2-40B4-BE49-F238E27FC236}">
-                  <a16:creationId xmlns:a16="http://schemas.microsoft.com/office/drawing/2014/main" id="{ED1C7227-82CF-4999-9BD2-9F0DCF922E67}"/>
-                </a:ext>
-              </a:extLst>
-            </p:cNvPr>
-            <p:cNvCxnSpPr>
-              <a:cxnSpLocks/>
-              <a:stCxn id="43" idx="1"/>
-              <a:endCxn id="40" idx="1"/>
-            </p:cNvCxnSpPr>
-            <p:nvPr/>
-          </p:nvCxnSpPr>
-          <p:spPr>
-            <a:xfrm flipH="1" flipV="1">
-              <a:off x="2000250" y="3294523"/>
-              <a:ext cx="5733567" cy="550072"/>
-            </a:xfrm>
-            <a:prstGeom prst="straightConnector1">
-              <a:avLst/>
-            </a:prstGeom>
-            <a:ln w="19050">
-              <a:solidFill>
-                <a:schemeClr val="accent1"/>
-              </a:solidFill>
-              <a:tailEnd type="triangle"/>
-            </a:ln>
-          </p:spPr>
-          <p:style>
-            <a:lnRef idx="1">
-              <a:schemeClr val="accent1"/>
-            </a:lnRef>
-            <a:fillRef idx="0">
-              <a:schemeClr val="accent1"/>
-            </a:fillRef>
-            <a:effectRef idx="0">
-              <a:schemeClr val="accent1"/>
-            </a:effectRef>
-            <a:fontRef idx="minor">
-              <a:schemeClr val="tx1"/>
-            </a:fontRef>
-          </p:style>
-        </p:cxnSp>
-        <p:grpSp>
-          <p:nvGrpSpPr>
-            <p:cNvPr id="50" name="Group 49">
-              <a:extLst>
-                <a:ext uri="{FF2B5EF4-FFF2-40B4-BE49-F238E27FC236}">
-                  <a16:creationId xmlns:a16="http://schemas.microsoft.com/office/drawing/2014/main" id="{589CEB2B-B446-4046-8929-6B586ACD16D0}"/>
-                </a:ext>
-              </a:extLst>
-            </p:cNvPr>
-            <p:cNvGrpSpPr/>
-            <p:nvPr/>
-          </p:nvGrpSpPr>
-          <p:grpSpPr>
-            <a:xfrm>
-              <a:off x="2243967" y="531975"/>
-              <a:ext cx="3181350" cy="1125154"/>
-              <a:chOff x="2043942" y="1265400"/>
-              <a:chExt cx="3181350" cy="1125154"/>
-            </a:xfrm>
-          </p:grpSpPr>
-          <p:pic>
-            <p:nvPicPr>
-              <p:cNvPr id="6" name="Picture 5">
-                <a:extLst>
-                  <a:ext uri="{FF2B5EF4-FFF2-40B4-BE49-F238E27FC236}">
-                    <a16:creationId xmlns:a16="http://schemas.microsoft.com/office/drawing/2014/main" id="{4D87C9EF-EF35-448E-8017-B0BAAE1A8A0A}"/>
-                  </a:ext>
-                </a:extLst>
-              </p:cNvPr>
-              <p:cNvPicPr>
-                <a:picLocks noChangeAspect="1"/>
-              </p:cNvPicPr>
-              <p:nvPr/>
-            </p:nvPicPr>
-            <p:blipFill>
-              <a:blip r:embed="rId5"/>
-              <a:stretch>
-                <a:fillRect/>
-              </a:stretch>
-            </p:blipFill>
-            <p:spPr>
-              <a:xfrm>
-                <a:off x="2043942" y="1666654"/>
-                <a:ext cx="3181350" cy="723900"/>
-              </a:xfrm>
-              <a:prstGeom prst="rect">
-                <a:avLst/>
-              </a:prstGeom>
-            </p:spPr>
-          </p:pic>
-          <p:sp>
-            <p:nvSpPr>
-              <p:cNvPr id="46" name="TextBox 45">
-                <a:extLst>
-                  <a:ext uri="{FF2B5EF4-FFF2-40B4-BE49-F238E27FC236}">
-                    <a16:creationId xmlns:a16="http://schemas.microsoft.com/office/drawing/2014/main" id="{29EBE705-40E0-4520-BDCC-39010E3575CF}"/>
-                  </a:ext>
-                </a:extLst>
-              </p:cNvPr>
-              <p:cNvSpPr txBox="1"/>
-              <p:nvPr/>
-            </p:nvSpPr>
-            <p:spPr>
-              <a:xfrm>
-                <a:off x="2261382" y="1265400"/>
-                <a:ext cx="2864861" cy="369332"/>
-              </a:xfrm>
-              <a:prstGeom prst="rect">
-                <a:avLst/>
-              </a:prstGeom>
-              <a:noFill/>
-            </p:spPr>
-            <p:txBody>
-              <a:bodyPr wrap="square" rtlCol="0">
-                <a:spAutoFit/>
-              </a:bodyPr>
-              <a:lstStyle/>
-              <a:p>
-                <a:pPr algn="ctr"/>
-                <a:r>
-                  <a:rPr lang="en-SG" dirty="0"/>
-                  <a:t>Step 1. Set working directory</a:t>
-                </a:r>
-              </a:p>
-            </p:txBody>
-          </p:sp>
-        </p:grpSp>
-        <p:sp>
-          <p:nvSpPr>
-            <p:cNvPr id="53" name="TextBox 52">
-              <a:extLst>
-                <a:ext uri="{FF2B5EF4-FFF2-40B4-BE49-F238E27FC236}">
-                  <a16:creationId xmlns:a16="http://schemas.microsoft.com/office/drawing/2014/main" id="{03F64BF8-D070-4F79-B7D4-C6B6CAE65E24}"/>
+                  <a16:creationId xmlns:a16="http://schemas.microsoft.com/office/drawing/2014/main" id="{64F614D8-7F05-443E-B96A-89E2735D52A5}"/>
                 </a:ext>
               </a:extLst>
             </p:cNvPr>
@@ -6152,8 +5842,8 @@
           </p:nvSpPr>
           <p:spPr>
             <a:xfrm>
-              <a:off x="7805254" y="4962760"/>
-              <a:ext cx="2771775" cy="369332"/>
+              <a:off x="7056232" y="1297322"/>
+              <a:ext cx="3501748" cy="369332"/>
             </a:xfrm>
             <a:prstGeom prst="rect">
               <a:avLst/>
@@ -6166,19 +5856,208 @@
             </a:bodyPr>
             <a:lstStyle/>
             <a:p>
+              <a:pPr algn="ctr"/>
               <a:r>
                 <a:rPr lang="en-SG" dirty="0"/>
-                <a:t>Step 3. Compress Folder</a:t>
+                <a:t>Step 2. Call script in console</a:t>
               </a:r>
             </a:p>
           </p:txBody>
         </p:sp>
+      </p:grpSp>
+      <p:pic>
+        <p:nvPicPr>
+          <p:cNvPr id="11" name="Picture 10">
+            <a:extLst>
+              <a:ext uri="{FF2B5EF4-FFF2-40B4-BE49-F238E27FC236}">
+                <a16:creationId xmlns:a16="http://schemas.microsoft.com/office/drawing/2014/main" id="{DAB1396F-0F10-41E8-9126-6C01B42B164A}"/>
+              </a:ext>
+            </a:extLst>
+          </p:cNvPr>
+          <p:cNvPicPr>
+            <a:picLocks noChangeAspect="1"/>
+          </p:cNvPicPr>
+          <p:nvPr/>
+        </p:nvPicPr>
+        <p:blipFill rotWithShape="1">
+          <a:blip r:embed="rId4"/>
+          <a:srcRect t="13773" r="39575" b="-18087"/>
+          <a:stretch/>
+        </p:blipFill>
+        <p:spPr>
+          <a:xfrm>
+            <a:off x="7350194" y="5453529"/>
+            <a:ext cx="3453295" cy="268272"/>
+          </a:xfrm>
+          <a:prstGeom prst="rect">
+            <a:avLst/>
+          </a:prstGeom>
+        </p:spPr>
+      </p:pic>
+      <p:cxnSp>
+        <p:nvCxnSpPr>
+          <p:cNvPr id="9" name="Straight Arrow Connector 8">
+            <a:extLst>
+              <a:ext uri="{FF2B5EF4-FFF2-40B4-BE49-F238E27FC236}">
+                <a16:creationId xmlns:a16="http://schemas.microsoft.com/office/drawing/2014/main" id="{DACEDD70-68D5-4297-AB00-17CF5551C93B}"/>
+              </a:ext>
+            </a:extLst>
+          </p:cNvPr>
+          <p:cNvCxnSpPr>
+            <a:cxnSpLocks/>
+            <a:stCxn id="6" idx="2"/>
+            <a:endCxn id="16" idx="0"/>
+          </p:cNvCxnSpPr>
+          <p:nvPr/>
+        </p:nvCxnSpPr>
+        <p:spPr>
+          <a:xfrm flipH="1">
+            <a:off x="2131321" y="1657129"/>
+            <a:ext cx="1703321" cy="730217"/>
+          </a:xfrm>
+          <a:prstGeom prst="straightConnector1">
+            <a:avLst/>
+          </a:prstGeom>
+          <a:ln w="19050">
+            <a:solidFill>
+              <a:schemeClr val="accent1"/>
+            </a:solidFill>
+            <a:tailEnd type="triangle"/>
+          </a:ln>
+        </p:spPr>
+        <p:style>
+          <a:lnRef idx="1">
+            <a:schemeClr val="accent1"/>
+          </a:lnRef>
+          <a:fillRef idx="0">
+            <a:schemeClr val="accent1"/>
+          </a:fillRef>
+          <a:effectRef idx="0">
+            <a:schemeClr val="accent1"/>
+          </a:effectRef>
+          <a:fontRef idx="minor">
+            <a:schemeClr val="tx1"/>
+          </a:fontRef>
+        </p:style>
+      </p:cxnSp>
+      <p:cxnSp>
+        <p:nvCxnSpPr>
+          <p:cNvPr id="34" name="Straight Arrow Connector 33">
+            <a:extLst>
+              <a:ext uri="{FF2B5EF4-FFF2-40B4-BE49-F238E27FC236}">
+                <a16:creationId xmlns:a16="http://schemas.microsoft.com/office/drawing/2014/main" id="{822BAE6C-4154-472B-B1CD-C4E87C228F5C}"/>
+              </a:ext>
+            </a:extLst>
+          </p:cNvPr>
+          <p:cNvCxnSpPr>
+            <a:cxnSpLocks/>
+            <a:stCxn id="19" idx="1"/>
+            <a:endCxn id="13" idx="3"/>
+          </p:cNvCxnSpPr>
+          <p:nvPr/>
+        </p:nvCxnSpPr>
+        <p:spPr>
+          <a:xfrm flipH="1" flipV="1">
+            <a:off x="4635912" y="2488853"/>
+            <a:ext cx="3100051" cy="1594"/>
+          </a:xfrm>
+          <a:prstGeom prst="straightConnector1">
+            <a:avLst/>
+          </a:prstGeom>
+          <a:ln w="19050">
+            <a:solidFill>
+              <a:schemeClr val="accent1"/>
+            </a:solidFill>
+            <a:tailEnd type="triangle"/>
+          </a:ln>
+        </p:spPr>
+        <p:style>
+          <a:lnRef idx="1">
+            <a:schemeClr val="accent1"/>
+          </a:lnRef>
+          <a:fillRef idx="0">
+            <a:schemeClr val="accent1"/>
+          </a:fillRef>
+          <a:effectRef idx="0">
+            <a:schemeClr val="accent1"/>
+          </a:effectRef>
+          <a:fontRef idx="minor">
+            <a:schemeClr val="tx1"/>
+          </a:fontRef>
+        </p:style>
+      </p:cxnSp>
+      <p:cxnSp>
+        <p:nvCxnSpPr>
+          <p:cNvPr id="41" name="Straight Arrow Connector 40">
+            <a:extLst>
+              <a:ext uri="{FF2B5EF4-FFF2-40B4-BE49-F238E27FC236}">
+                <a16:creationId xmlns:a16="http://schemas.microsoft.com/office/drawing/2014/main" id="{ED1C7227-82CF-4999-9BD2-9F0DCF922E67}"/>
+              </a:ext>
+            </a:extLst>
+          </p:cNvPr>
+          <p:cNvCxnSpPr>
+            <a:cxnSpLocks/>
+            <a:stCxn id="43" idx="1"/>
+            <a:endCxn id="40" idx="1"/>
+          </p:cNvCxnSpPr>
+          <p:nvPr/>
+        </p:nvCxnSpPr>
+        <p:spPr>
+          <a:xfrm flipH="1" flipV="1">
+            <a:off x="2000250" y="3294523"/>
+            <a:ext cx="5733567" cy="550072"/>
+          </a:xfrm>
+          <a:prstGeom prst="straightConnector1">
+            <a:avLst/>
+          </a:prstGeom>
+          <a:ln w="19050">
+            <a:solidFill>
+              <a:schemeClr val="accent1"/>
+            </a:solidFill>
+            <a:tailEnd type="triangle"/>
+          </a:ln>
+        </p:spPr>
+        <p:style>
+          <a:lnRef idx="1">
+            <a:schemeClr val="accent1"/>
+          </a:lnRef>
+          <a:fillRef idx="0">
+            <a:schemeClr val="accent1"/>
+          </a:fillRef>
+          <a:effectRef idx="0">
+            <a:schemeClr val="accent1"/>
+          </a:effectRef>
+          <a:fontRef idx="minor">
+            <a:schemeClr val="tx1"/>
+          </a:fontRef>
+        </p:style>
+      </p:cxnSp>
+      <p:grpSp>
+        <p:nvGrpSpPr>
+          <p:cNvPr id="50" name="Group 49">
+            <a:extLst>
+              <a:ext uri="{FF2B5EF4-FFF2-40B4-BE49-F238E27FC236}">
+                <a16:creationId xmlns:a16="http://schemas.microsoft.com/office/drawing/2014/main" id="{589CEB2B-B446-4046-8929-6B586ACD16D0}"/>
+              </a:ext>
+            </a:extLst>
+          </p:cNvPr>
+          <p:cNvGrpSpPr/>
+          <p:nvPr/>
+        </p:nvGrpSpPr>
+        <p:grpSpPr>
+          <a:xfrm>
+            <a:off x="2243967" y="531975"/>
+            <a:ext cx="3181350" cy="1125154"/>
+            <a:chOff x="2043942" y="1265400"/>
+            <a:chExt cx="3181350" cy="1125154"/>
+          </a:xfrm>
+        </p:grpSpPr>
         <p:pic>
           <p:nvPicPr>
-            <p:cNvPr id="54" name="Picture 53">
+            <p:cNvPr id="6" name="Picture 5">
               <a:extLst>
                 <a:ext uri="{FF2B5EF4-FFF2-40B4-BE49-F238E27FC236}">
-                  <a16:creationId xmlns:a16="http://schemas.microsoft.com/office/drawing/2014/main" id="{B1FF594E-2B4E-42C6-B511-1311545E9B7D}"/>
+                  <a16:creationId xmlns:a16="http://schemas.microsoft.com/office/drawing/2014/main" id="{4D87C9EF-EF35-448E-8017-B0BAAE1A8A0A}"/>
                 </a:ext>
               </a:extLst>
             </p:cNvPr>
@@ -6188,64 +6067,165 @@
             <p:nvPr/>
           </p:nvPicPr>
           <p:blipFill>
-            <a:blip r:embed="rId6"/>
+            <a:blip r:embed="rId5"/>
             <a:stretch>
               <a:fillRect/>
             </a:stretch>
           </p:blipFill>
           <p:spPr>
             <a:xfrm>
-              <a:off x="2831393" y="3887536"/>
-              <a:ext cx="3855003" cy="2405984"/>
+              <a:off x="2043942" y="1666654"/>
+              <a:ext cx="3181350" cy="723900"/>
             </a:xfrm>
             <a:prstGeom prst="rect">
               <a:avLst/>
             </a:prstGeom>
           </p:spPr>
         </p:pic>
-        <p:cxnSp>
-          <p:nvCxnSpPr>
-            <p:cNvPr id="59" name="Connector: Elbow 58">
+        <p:sp>
+          <p:nvSpPr>
+            <p:cNvPr id="46" name="TextBox 45">
               <a:extLst>
                 <a:ext uri="{FF2B5EF4-FFF2-40B4-BE49-F238E27FC236}">
-                  <a16:creationId xmlns:a16="http://schemas.microsoft.com/office/drawing/2014/main" id="{9C6287AB-CE49-430F-9142-B77B1E1455E7}"/>
+                  <a16:creationId xmlns:a16="http://schemas.microsoft.com/office/drawing/2014/main" id="{29EBE705-40E0-4520-BDCC-39010E3575CF}"/>
                 </a:ext>
               </a:extLst>
             </p:cNvPr>
-            <p:cNvCxnSpPr>
-              <a:stCxn id="55" idx="2"/>
-              <a:endCxn id="54" idx="1"/>
-            </p:cNvCxnSpPr>
+            <p:cNvSpPr txBox="1"/>
             <p:nvPr/>
-          </p:nvCxnSpPr>
+          </p:nvSpPr>
           <p:spPr>
-            <a:xfrm rot="16200000" flipH="1">
-              <a:off x="1364762" y="3623897"/>
-              <a:ext cx="1511444" cy="1421817"/>
+            <a:xfrm>
+              <a:off x="2261382" y="1265400"/>
+              <a:ext cx="2864861" cy="369332"/>
             </a:xfrm>
-            <a:prstGeom prst="bentConnector2">
+            <a:prstGeom prst="rect">
               <a:avLst/>
             </a:prstGeom>
-            <a:ln w="19050">
-              <a:tailEnd type="triangle"/>
-            </a:ln>
+            <a:noFill/>
           </p:spPr>
-          <p:style>
-            <a:lnRef idx="1">
-              <a:schemeClr val="accent1"/>
-            </a:lnRef>
-            <a:fillRef idx="0">
-              <a:schemeClr val="accent1"/>
-            </a:fillRef>
-            <a:effectRef idx="0">
-              <a:schemeClr val="accent1"/>
-            </a:effectRef>
-            <a:fontRef idx="minor">
-              <a:schemeClr val="tx1"/>
-            </a:fontRef>
-          </p:style>
-        </p:cxnSp>
+          <p:txBody>
+            <a:bodyPr wrap="square" rtlCol="0">
+              <a:spAutoFit/>
+            </a:bodyPr>
+            <a:lstStyle/>
+            <a:p>
+              <a:pPr algn="ctr"/>
+              <a:r>
+                <a:rPr lang="en-SG" dirty="0"/>
+                <a:t>Step 1. Set working directory</a:t>
+              </a:r>
+            </a:p>
+          </p:txBody>
+        </p:sp>
       </p:grpSp>
+      <p:sp>
+        <p:nvSpPr>
+          <p:cNvPr id="53" name="TextBox 52">
+            <a:extLst>
+              <a:ext uri="{FF2B5EF4-FFF2-40B4-BE49-F238E27FC236}">
+                <a16:creationId xmlns:a16="http://schemas.microsoft.com/office/drawing/2014/main" id="{03F64BF8-D070-4F79-B7D4-C6B6CAE65E24}"/>
+              </a:ext>
+            </a:extLst>
+          </p:cNvPr>
+          <p:cNvSpPr txBox="1"/>
+          <p:nvPr/>
+        </p:nvSpPr>
+        <p:spPr>
+          <a:xfrm>
+            <a:off x="7805254" y="4962760"/>
+            <a:ext cx="2771775" cy="369332"/>
+          </a:xfrm>
+          <a:prstGeom prst="rect">
+            <a:avLst/>
+          </a:prstGeom>
+          <a:noFill/>
+        </p:spPr>
+        <p:txBody>
+          <a:bodyPr wrap="square" rtlCol="0">
+            <a:spAutoFit/>
+          </a:bodyPr>
+          <a:lstStyle/>
+          <a:p>
+            <a:r>
+              <a:rPr lang="en-SG" dirty="0"/>
+              <a:t>Step 3. Compress Folder</a:t>
+            </a:r>
+          </a:p>
+        </p:txBody>
+      </p:sp>
+      <p:pic>
+        <p:nvPicPr>
+          <p:cNvPr id="54" name="Picture 53">
+            <a:extLst>
+              <a:ext uri="{FF2B5EF4-FFF2-40B4-BE49-F238E27FC236}">
+                <a16:creationId xmlns:a16="http://schemas.microsoft.com/office/drawing/2014/main" id="{B1FF594E-2B4E-42C6-B511-1311545E9B7D}"/>
+              </a:ext>
+            </a:extLst>
+          </p:cNvPr>
+          <p:cNvPicPr>
+            <a:picLocks noChangeAspect="1"/>
+          </p:cNvPicPr>
+          <p:nvPr/>
+        </p:nvPicPr>
+        <p:blipFill>
+          <a:blip r:embed="rId6"/>
+          <a:stretch>
+            <a:fillRect/>
+          </a:stretch>
+        </p:blipFill>
+        <p:spPr>
+          <a:xfrm>
+            <a:off x="2831393" y="3887536"/>
+            <a:ext cx="3855003" cy="2405984"/>
+          </a:xfrm>
+          <a:prstGeom prst="rect">
+            <a:avLst/>
+          </a:prstGeom>
+        </p:spPr>
+      </p:pic>
+      <p:cxnSp>
+        <p:nvCxnSpPr>
+          <p:cNvPr id="59" name="Connector: Elbow 58">
+            <a:extLst>
+              <a:ext uri="{FF2B5EF4-FFF2-40B4-BE49-F238E27FC236}">
+                <a16:creationId xmlns:a16="http://schemas.microsoft.com/office/drawing/2014/main" id="{9C6287AB-CE49-430F-9142-B77B1E1455E7}"/>
+              </a:ext>
+            </a:extLst>
+          </p:cNvPr>
+          <p:cNvCxnSpPr>
+            <a:stCxn id="55" idx="2"/>
+            <a:endCxn id="54" idx="1"/>
+          </p:cNvCxnSpPr>
+          <p:nvPr/>
+        </p:nvCxnSpPr>
+        <p:spPr>
+          <a:xfrm rot="16200000" flipH="1">
+            <a:off x="1364762" y="3623897"/>
+            <a:ext cx="1511444" cy="1421817"/>
+          </a:xfrm>
+          <a:prstGeom prst="bentConnector2">
+            <a:avLst/>
+          </a:prstGeom>
+          <a:ln w="19050">
+            <a:tailEnd type="triangle"/>
+          </a:ln>
+        </p:spPr>
+        <p:style>
+          <a:lnRef idx="1">
+            <a:schemeClr val="accent1"/>
+          </a:lnRef>
+          <a:fillRef idx="0">
+            <a:schemeClr val="accent1"/>
+          </a:fillRef>
+          <a:effectRef idx="0">
+            <a:schemeClr val="accent1"/>
+          </a:effectRef>
+          <a:fontRef idx="minor">
+            <a:schemeClr val="tx1"/>
+          </a:fontRef>
+        </p:style>
+      </p:cxnSp>
     </p:spTree>
     <p:extLst>
       <p:ext uri="{BB962C8B-B14F-4D97-AF65-F5344CB8AC3E}">
@@ -7475,6 +7455,264 @@
           <a:chExt cx="0" cy="0"/>
         </a:xfrm>
       </p:grpSpPr>
+      <p:grpSp>
+        <p:nvGrpSpPr>
+          <p:cNvPr id="8" name="Group 7">
+            <a:extLst>
+              <a:ext uri="{FF2B5EF4-FFF2-40B4-BE49-F238E27FC236}">
+                <a16:creationId xmlns:a16="http://schemas.microsoft.com/office/drawing/2014/main" id="{6521A941-1C94-4B55-B2A4-093D13842394}"/>
+              </a:ext>
+            </a:extLst>
+          </p:cNvPr>
+          <p:cNvGrpSpPr/>
+          <p:nvPr/>
+        </p:nvGrpSpPr>
+        <p:grpSpPr>
+          <a:xfrm>
+            <a:off x="-125146" y="12602"/>
+            <a:ext cx="12418373" cy="6832796"/>
+            <a:chOff x="-125146" y="12602"/>
+            <a:chExt cx="12418373" cy="6832796"/>
+          </a:xfrm>
+        </p:grpSpPr>
+        <p:pic>
+          <p:nvPicPr>
+            <p:cNvPr id="1047" name="Picture 23" descr="https://lh5.googleusercontent.com/gqiC-Gs6uqfOXXB2Cl0WY93uiP-TgDyxtHjB8fi1v8R7bd7BrTlSpfJ3y6VmC8wMjlJjlcwny-kB2h2Xzw5HpR1bjBxJemkrVvnghIGENDp8-FFsaDQzEsoyY100CBqudVRXvXQIkbn-f2644Ru_OCLtarZ4oxl8nGzfJgX7t2QVbzbnDg21UQ">
+              <a:extLst>
+                <a:ext uri="{FF2B5EF4-FFF2-40B4-BE49-F238E27FC236}">
+                  <a16:creationId xmlns:a16="http://schemas.microsoft.com/office/drawing/2014/main" id="{A6B4C7AB-E54D-491E-A625-F5433019047A}"/>
+                </a:ext>
+              </a:extLst>
+            </p:cNvPr>
+            <p:cNvPicPr>
+              <a:picLocks noChangeAspect="1" noChangeArrowheads="1"/>
+            </p:cNvPicPr>
+            <p:nvPr/>
+          </p:nvPicPr>
+          <p:blipFill>
+            <a:blip r:embed="rId2">
+              <a:extLst>
+                <a:ext uri="{28A0092B-C50C-407E-A947-70E740481C1C}">
+                  <a14:useLocalDpi xmlns:a14="http://schemas.microsoft.com/office/drawing/2010/main" val="0"/>
+                </a:ext>
+              </a:extLst>
+            </a:blip>
+            <a:srcRect/>
+            <a:stretch>
+              <a:fillRect/>
+            </a:stretch>
+          </p:blipFill>
+          <p:spPr bwMode="auto">
+            <a:xfrm>
+              <a:off x="0" y="5457629"/>
+              <a:ext cx="12293227" cy="1387769"/>
+            </a:xfrm>
+            <a:prstGeom prst="rect">
+              <a:avLst/>
+            </a:prstGeom>
+            <a:noFill/>
+            <a:extLst>
+              <a:ext uri="{909E8E84-426E-40DD-AFC4-6F175D3DCCD1}">
+                <a14:hiddenFill xmlns:a14="http://schemas.microsoft.com/office/drawing/2010/main">
+                  <a:solidFill>
+                    <a:srgbClr val="FFFFFF"/>
+                  </a:solidFill>
+                </a14:hiddenFill>
+              </a:ext>
+            </a:extLst>
+          </p:spPr>
+        </p:pic>
+        <p:pic>
+          <p:nvPicPr>
+            <p:cNvPr id="1049" name="Picture 25" descr="https://lh5.googleusercontent.com/R4ulxtpn2cV_ozjWSGfyDquICHUg2U_57EdD_lAIkDhh0_WfjzwxhckoGc6wTfgd__WltNgbOKeFWrCs4mbo_i0SBWyjBa-7VxSlVkoUoxtec7K-Z6OMhtwa_h2Xos_gm9i9UVTHy4hq9HsYqhKlejUAuW5IjbtHcYjlIt9Vc928hJaZy0C1Jw">
+              <a:extLst>
+                <a:ext uri="{FF2B5EF4-FFF2-40B4-BE49-F238E27FC236}">
+                  <a16:creationId xmlns:a16="http://schemas.microsoft.com/office/drawing/2014/main" id="{DA749F8E-A2FB-49EC-B117-5A9DD72A3E03}"/>
+                </a:ext>
+              </a:extLst>
+            </p:cNvPr>
+            <p:cNvPicPr>
+              <a:picLocks noChangeAspect="1" noChangeArrowheads="1"/>
+            </p:cNvPicPr>
+            <p:nvPr/>
+          </p:nvPicPr>
+          <p:blipFill>
+            <a:blip r:embed="rId3">
+              <a:extLst>
+                <a:ext uri="{28A0092B-C50C-407E-A947-70E740481C1C}">
+                  <a14:useLocalDpi xmlns:a14="http://schemas.microsoft.com/office/drawing/2010/main" val="0"/>
+                </a:ext>
+              </a:extLst>
+            </a:blip>
+            <a:srcRect/>
+            <a:stretch>
+              <a:fillRect/>
+            </a:stretch>
+          </p:blipFill>
+          <p:spPr bwMode="auto">
+            <a:xfrm>
+              <a:off x="8511093" y="6155202"/>
+              <a:ext cx="2974319" cy="608985"/>
+            </a:xfrm>
+            <a:prstGeom prst="rect">
+              <a:avLst/>
+            </a:prstGeom>
+            <a:noFill/>
+            <a:extLst>
+              <a:ext uri="{909E8E84-426E-40DD-AFC4-6F175D3DCCD1}">
+                <a14:hiddenFill xmlns:a14="http://schemas.microsoft.com/office/drawing/2010/main">
+                  <a:solidFill>
+                    <a:srgbClr val="FFFFFF"/>
+                  </a:solidFill>
+                </a14:hiddenFill>
+              </a:ext>
+            </a:extLst>
+          </p:spPr>
+        </p:pic>
+        <p:pic>
+          <p:nvPicPr>
+            <p:cNvPr id="32" name="Picture 23" descr="https://lh5.googleusercontent.com/gqiC-Gs6uqfOXXB2Cl0WY93uiP-TgDyxtHjB8fi1v8R7bd7BrTlSpfJ3y6VmC8wMjlJjlcwny-kB2h2Xzw5HpR1bjBxJemkrVvnghIGENDp8-FFsaDQzEsoyY100CBqudVRXvXQIkbn-f2644Ru_OCLtarZ4oxl8nGzfJgX7t2QVbzbnDg21UQ">
+              <a:extLst>
+                <a:ext uri="{FF2B5EF4-FFF2-40B4-BE49-F238E27FC236}">
+                  <a16:creationId xmlns:a16="http://schemas.microsoft.com/office/drawing/2014/main" id="{B4CA5873-F7EF-457A-960C-DAFDAE5BBD6F}"/>
+                </a:ext>
+              </a:extLst>
+            </p:cNvPr>
+            <p:cNvPicPr>
+              <a:picLocks noChangeAspect="1" noChangeArrowheads="1"/>
+            </p:cNvPicPr>
+            <p:nvPr/>
+          </p:nvPicPr>
+          <p:blipFill>
+            <a:blip r:embed="rId2">
+              <a:extLst>
+                <a:ext uri="{28A0092B-C50C-407E-A947-70E740481C1C}">
+                  <a14:useLocalDpi xmlns:a14="http://schemas.microsoft.com/office/drawing/2010/main" val="0"/>
+                </a:ext>
+              </a:extLst>
+            </a:blip>
+            <a:srcRect/>
+            <a:stretch>
+              <a:fillRect/>
+            </a:stretch>
+          </p:blipFill>
+          <p:spPr bwMode="auto">
+            <a:xfrm rot="10800000">
+              <a:off x="-125146" y="12602"/>
+              <a:ext cx="12227873" cy="1380391"/>
+            </a:xfrm>
+            <a:prstGeom prst="rect">
+              <a:avLst/>
+            </a:prstGeom>
+            <a:noFill/>
+            <a:extLst>
+              <a:ext uri="{909E8E84-426E-40DD-AFC4-6F175D3DCCD1}">
+                <a14:hiddenFill xmlns:a14="http://schemas.microsoft.com/office/drawing/2010/main">
+                  <a:solidFill>
+                    <a:srgbClr val="FFFFFF"/>
+                  </a:solidFill>
+                </a14:hiddenFill>
+              </a:ext>
+            </a:extLst>
+          </p:spPr>
+        </p:pic>
+      </p:grpSp>
+    </p:spTree>
+    <p:extLst>
+      <p:ext uri="{BB962C8B-B14F-4D97-AF65-F5344CB8AC3E}">
+        <p14:creationId xmlns:p14="http://schemas.microsoft.com/office/powerpoint/2010/main" val="3848179678"/>
+      </p:ext>
+    </p:extLst>
+  </p:cSld>
+  <p:clrMapOvr>
+    <a:masterClrMapping/>
+  </p:clrMapOvr>
+</p:sld>
+</file>
+
+<file path=ppt/slides/slide2.xml><?xml version="1.0" encoding="utf-8"?>
+<p:sld xmlns:a="http://schemas.openxmlformats.org/drawingml/2006/main" xmlns:r="http://schemas.openxmlformats.org/officeDocument/2006/relationships" xmlns:p="http://schemas.openxmlformats.org/presentationml/2006/main">
+  <p:cSld>
+    <p:spTree>
+      <p:nvGrpSpPr>
+        <p:cNvPr id="1" name=""/>
+        <p:cNvGrpSpPr/>
+        <p:nvPr/>
+      </p:nvGrpSpPr>
+      <p:grpSpPr>
+        <a:xfrm>
+          <a:off x="0" y="0"/>
+          <a:ext cx="0" cy="0"/>
+          <a:chOff x="0" y="0"/>
+          <a:chExt cx="0" cy="0"/>
+        </a:xfrm>
+      </p:grpSpPr>
+      <p:pic>
+        <p:nvPicPr>
+          <p:cNvPr id="4" name="Picture 3">
+            <a:extLst>
+              <a:ext uri="{FF2B5EF4-FFF2-40B4-BE49-F238E27FC236}">
+                <a16:creationId xmlns:a16="http://schemas.microsoft.com/office/drawing/2014/main" id="{C17BAD7B-C9C0-4980-90E8-32AB9AF3874A}"/>
+              </a:ext>
+            </a:extLst>
+          </p:cNvPr>
+          <p:cNvPicPr>
+            <a:picLocks noChangeAspect="1"/>
+          </p:cNvPicPr>
+          <p:nvPr/>
+        </p:nvPicPr>
+        <p:blipFill>
+          <a:blip r:embed="rId2">
+            <a:extLst>
+              <a:ext uri="{28A0092B-C50C-407E-A947-70E740481C1C}">
+                <a14:useLocalDpi xmlns:a14="http://schemas.microsoft.com/office/drawing/2010/main" val="0"/>
+              </a:ext>
+            </a:extLst>
+          </a:blip>
+          <a:stretch>
+            <a:fillRect/>
+          </a:stretch>
+        </p:blipFill>
+        <p:spPr>
+          <a:xfrm>
+            <a:off x="3645989" y="1131179"/>
+            <a:ext cx="3887575" cy="3898364"/>
+          </a:xfrm>
+          <a:prstGeom prst="rect">
+            <a:avLst/>
+          </a:prstGeom>
+        </p:spPr>
+      </p:pic>
+    </p:spTree>
+    <p:extLst>
+      <p:ext uri="{BB962C8B-B14F-4D97-AF65-F5344CB8AC3E}">
+        <p14:creationId xmlns:p14="http://schemas.microsoft.com/office/powerpoint/2010/main" val="2423353379"/>
+      </p:ext>
+    </p:extLst>
+  </p:cSld>
+  <p:clrMapOvr>
+    <a:masterClrMapping/>
+  </p:clrMapOvr>
+</p:sld>
+</file>
+
+<file path=ppt/slides/slide20.xml><?xml version="1.0" encoding="utf-8"?>
+<p:sld xmlns:a="http://schemas.openxmlformats.org/drawingml/2006/main" xmlns:r="http://schemas.openxmlformats.org/officeDocument/2006/relationships" xmlns:p="http://schemas.openxmlformats.org/presentationml/2006/main">
+  <p:cSld>
+    <p:spTree>
+      <p:nvGrpSpPr>
+        <p:cNvPr id="1" name=""/>
+        <p:cNvGrpSpPr/>
+        <p:nvPr/>
+      </p:nvGrpSpPr>
+      <p:grpSpPr>
+        <a:xfrm>
+          <a:off x="0" y="0"/>
+          <a:ext cx="0" cy="0"/>
+          <a:chOff x="0" y="0"/>
+          <a:chExt cx="0" cy="0"/>
+        </a:xfrm>
+      </p:grpSpPr>
       <p:pic>
         <p:nvPicPr>
           <p:cNvPr id="10" name="Picture 2" descr="Related image">
@@ -7579,72 +7817,6 @@
     <p:extLst>
       <p:ext uri="{BB962C8B-B14F-4D97-AF65-F5344CB8AC3E}">
         <p14:creationId xmlns:p14="http://schemas.microsoft.com/office/powerpoint/2010/main" val="3427638432"/>
-      </p:ext>
-    </p:extLst>
-  </p:cSld>
-  <p:clrMapOvr>
-    <a:masterClrMapping/>
-  </p:clrMapOvr>
-</p:sld>
-</file>
-
-<file path=ppt/slides/slide2.xml><?xml version="1.0" encoding="utf-8"?>
-<p:sld xmlns:a="http://schemas.openxmlformats.org/drawingml/2006/main" xmlns:r="http://schemas.openxmlformats.org/officeDocument/2006/relationships" xmlns:p="http://schemas.openxmlformats.org/presentationml/2006/main">
-  <p:cSld>
-    <p:spTree>
-      <p:nvGrpSpPr>
-        <p:cNvPr id="1" name=""/>
-        <p:cNvGrpSpPr/>
-        <p:nvPr/>
-      </p:nvGrpSpPr>
-      <p:grpSpPr>
-        <a:xfrm>
-          <a:off x="0" y="0"/>
-          <a:ext cx="0" cy="0"/>
-          <a:chOff x="0" y="0"/>
-          <a:chExt cx="0" cy="0"/>
-        </a:xfrm>
-      </p:grpSpPr>
-      <p:pic>
-        <p:nvPicPr>
-          <p:cNvPr id="4" name="Picture 3">
-            <a:extLst>
-              <a:ext uri="{FF2B5EF4-FFF2-40B4-BE49-F238E27FC236}">
-                <a16:creationId xmlns:a16="http://schemas.microsoft.com/office/drawing/2014/main" id="{C17BAD7B-C9C0-4980-90E8-32AB9AF3874A}"/>
-              </a:ext>
-            </a:extLst>
-          </p:cNvPr>
-          <p:cNvPicPr>
-            <a:picLocks noChangeAspect="1"/>
-          </p:cNvPicPr>
-          <p:nvPr/>
-        </p:nvPicPr>
-        <p:blipFill>
-          <a:blip r:embed="rId2">
-            <a:extLst>
-              <a:ext uri="{28A0092B-C50C-407E-A947-70E740481C1C}">
-                <a14:useLocalDpi xmlns:a14="http://schemas.microsoft.com/office/drawing/2010/main" val="0"/>
-              </a:ext>
-            </a:extLst>
-          </a:blip>
-          <a:stretch>
-            <a:fillRect/>
-          </a:stretch>
-        </p:blipFill>
-        <p:spPr>
-          <a:xfrm>
-            <a:off x="3645989" y="1131179"/>
-            <a:ext cx="3887575" cy="3898364"/>
-          </a:xfrm>
-          <a:prstGeom prst="rect">
-            <a:avLst/>
-          </a:prstGeom>
-        </p:spPr>
-      </p:pic>
-    </p:spTree>
-    <p:extLst>
-      <p:ext uri="{BB962C8B-B14F-4D97-AF65-F5344CB8AC3E}">
-        <p14:creationId xmlns:p14="http://schemas.microsoft.com/office/powerpoint/2010/main" val="2423353379"/>
       </p:ext>
     </p:extLst>
   </p:cSld>

</xml_diff>

<commit_message>
Add a pdf file
</commit_message>
<xml_diff>
--- a/images/Image_In_ppt.pptx
+++ b/images/Image_In_ppt.pptx
@@ -280,7 +280,7 @@
           <a:p>
             <a:fld id="{6AD9268C-4043-4F47-9E5A-AF01BC7E8A5E}" type="datetimeFigureOut">
               <a:rPr lang="en-SG" smtClean="0"/>
-              <a:t>28/10/2022</a:t>
+              <a:t>2/11/2022</a:t>
             </a:fld>
             <a:endParaRPr lang="en-SG"/>
           </a:p>
@@ -480,7 +480,7 @@
           <a:p>
             <a:fld id="{6AD9268C-4043-4F47-9E5A-AF01BC7E8A5E}" type="datetimeFigureOut">
               <a:rPr lang="en-SG" smtClean="0"/>
-              <a:t>28/10/2022</a:t>
+              <a:t>2/11/2022</a:t>
             </a:fld>
             <a:endParaRPr lang="en-SG"/>
           </a:p>
@@ -690,7 +690,7 @@
           <a:p>
             <a:fld id="{6AD9268C-4043-4F47-9E5A-AF01BC7E8A5E}" type="datetimeFigureOut">
               <a:rPr lang="en-SG" smtClean="0"/>
-              <a:t>28/10/2022</a:t>
+              <a:t>2/11/2022</a:t>
             </a:fld>
             <a:endParaRPr lang="en-SG"/>
           </a:p>
@@ -890,7 +890,7 @@
           <a:p>
             <a:fld id="{6AD9268C-4043-4F47-9E5A-AF01BC7E8A5E}" type="datetimeFigureOut">
               <a:rPr lang="en-SG" smtClean="0"/>
-              <a:t>28/10/2022</a:t>
+              <a:t>2/11/2022</a:t>
             </a:fld>
             <a:endParaRPr lang="en-SG"/>
           </a:p>
@@ -1166,7 +1166,7 @@
           <a:p>
             <a:fld id="{6AD9268C-4043-4F47-9E5A-AF01BC7E8A5E}" type="datetimeFigureOut">
               <a:rPr lang="en-SG" smtClean="0"/>
-              <a:t>28/10/2022</a:t>
+              <a:t>2/11/2022</a:t>
             </a:fld>
             <a:endParaRPr lang="en-SG"/>
           </a:p>
@@ -1434,7 +1434,7 @@
           <a:p>
             <a:fld id="{6AD9268C-4043-4F47-9E5A-AF01BC7E8A5E}" type="datetimeFigureOut">
               <a:rPr lang="en-SG" smtClean="0"/>
-              <a:t>28/10/2022</a:t>
+              <a:t>2/11/2022</a:t>
             </a:fld>
             <a:endParaRPr lang="en-SG"/>
           </a:p>
@@ -1849,7 +1849,7 @@
           <a:p>
             <a:fld id="{6AD9268C-4043-4F47-9E5A-AF01BC7E8A5E}" type="datetimeFigureOut">
               <a:rPr lang="en-SG" smtClean="0"/>
-              <a:t>28/10/2022</a:t>
+              <a:t>2/11/2022</a:t>
             </a:fld>
             <a:endParaRPr lang="en-SG"/>
           </a:p>
@@ -1991,7 +1991,7 @@
           <a:p>
             <a:fld id="{6AD9268C-4043-4F47-9E5A-AF01BC7E8A5E}" type="datetimeFigureOut">
               <a:rPr lang="en-SG" smtClean="0"/>
-              <a:t>28/10/2022</a:t>
+              <a:t>2/11/2022</a:t>
             </a:fld>
             <a:endParaRPr lang="en-SG"/>
           </a:p>
@@ -2104,7 +2104,7 @@
           <a:p>
             <a:fld id="{6AD9268C-4043-4F47-9E5A-AF01BC7E8A5E}" type="datetimeFigureOut">
               <a:rPr lang="en-SG" smtClean="0"/>
-              <a:t>28/10/2022</a:t>
+              <a:t>2/11/2022</a:t>
             </a:fld>
             <a:endParaRPr lang="en-SG"/>
           </a:p>
@@ -2417,7 +2417,7 @@
           <a:p>
             <a:fld id="{6AD9268C-4043-4F47-9E5A-AF01BC7E8A5E}" type="datetimeFigureOut">
               <a:rPr lang="en-SG" smtClean="0"/>
-              <a:t>28/10/2022</a:t>
+              <a:t>2/11/2022</a:t>
             </a:fld>
             <a:endParaRPr lang="en-SG"/>
           </a:p>
@@ -2706,7 +2706,7 @@
           <a:p>
             <a:fld id="{6AD9268C-4043-4F47-9E5A-AF01BC7E8A5E}" type="datetimeFigureOut">
               <a:rPr lang="en-SG" smtClean="0"/>
-              <a:t>28/10/2022</a:t>
+              <a:t>2/11/2022</a:t>
             </a:fld>
             <a:endParaRPr lang="en-SG"/>
           </a:p>
@@ -2949,7 +2949,7 @@
           <a:p>
             <a:fld id="{6AD9268C-4043-4F47-9E5A-AF01BC7E8A5E}" type="datetimeFigureOut">
               <a:rPr lang="en-SG" smtClean="0"/>
-              <a:t>28/10/2022</a:t>
+              <a:t>2/11/2022</a:t>
             </a:fld>
             <a:endParaRPr lang="en-SG"/>
           </a:p>
@@ -7457,10 +7457,10 @@
       </p:grpSpPr>
       <p:grpSp>
         <p:nvGrpSpPr>
-          <p:cNvPr id="8" name="Group 7">
-            <a:extLst>
-              <a:ext uri="{FF2B5EF4-FFF2-40B4-BE49-F238E27FC236}">
-                <a16:creationId xmlns:a16="http://schemas.microsoft.com/office/drawing/2014/main" id="{6521A941-1C94-4B55-B2A4-093D13842394}"/>
+          <p:cNvPr id="2" name="Group 1">
+            <a:extLst>
+              <a:ext uri="{FF2B5EF4-FFF2-40B4-BE49-F238E27FC236}">
+                <a16:creationId xmlns:a16="http://schemas.microsoft.com/office/drawing/2014/main" id="{E2476B1D-5D5B-489A-AFBC-D9C12AC2AA26}"/>
               </a:ext>
             </a:extLst>
           </p:cNvPr>
@@ -7506,53 +7506,6 @@
             <a:xfrm>
               <a:off x="0" y="5457629"/>
               <a:ext cx="12293227" cy="1387769"/>
-            </a:xfrm>
-            <a:prstGeom prst="rect">
-              <a:avLst/>
-            </a:prstGeom>
-            <a:noFill/>
-            <a:extLst>
-              <a:ext uri="{909E8E84-426E-40DD-AFC4-6F175D3DCCD1}">
-                <a14:hiddenFill xmlns:a14="http://schemas.microsoft.com/office/drawing/2010/main">
-                  <a:solidFill>
-                    <a:srgbClr val="FFFFFF"/>
-                  </a:solidFill>
-                </a14:hiddenFill>
-              </a:ext>
-            </a:extLst>
-          </p:spPr>
-        </p:pic>
-        <p:pic>
-          <p:nvPicPr>
-            <p:cNvPr id="1049" name="Picture 25" descr="https://lh5.googleusercontent.com/R4ulxtpn2cV_ozjWSGfyDquICHUg2U_57EdD_lAIkDhh0_WfjzwxhckoGc6wTfgd__WltNgbOKeFWrCs4mbo_i0SBWyjBa-7VxSlVkoUoxtec7K-Z6OMhtwa_h2Xos_gm9i9UVTHy4hq9HsYqhKlejUAuW5IjbtHcYjlIt9Vc928hJaZy0C1Jw">
-              <a:extLst>
-                <a:ext uri="{FF2B5EF4-FFF2-40B4-BE49-F238E27FC236}">
-                  <a16:creationId xmlns:a16="http://schemas.microsoft.com/office/drawing/2014/main" id="{DA749F8E-A2FB-49EC-B117-5A9DD72A3E03}"/>
-                </a:ext>
-              </a:extLst>
-            </p:cNvPr>
-            <p:cNvPicPr>
-              <a:picLocks noChangeAspect="1" noChangeArrowheads="1"/>
-            </p:cNvPicPr>
-            <p:nvPr/>
-          </p:nvPicPr>
-          <p:blipFill>
-            <a:blip r:embed="rId3">
-              <a:extLst>
-                <a:ext uri="{28A0092B-C50C-407E-A947-70E740481C1C}">
-                  <a14:useLocalDpi xmlns:a14="http://schemas.microsoft.com/office/drawing/2010/main" val="0"/>
-                </a:ext>
-              </a:extLst>
-            </a:blip>
-            <a:srcRect/>
-            <a:stretch>
-              <a:fillRect/>
-            </a:stretch>
-          </p:blipFill>
-          <p:spPr bwMode="auto">
-            <a:xfrm>
-              <a:off x="8511093" y="6155202"/>
-              <a:ext cx="2974319" cy="608985"/>
             </a:xfrm>
             <a:prstGeom prst="rect">
               <a:avLst/>

</xml_diff>